<commit_message>
Update and add new HST 103 lecture notes
Updated existing lecture notes for HST 103 (T2, T3, T4) and added new presentations on Medieval Syncretism, Famine of 1770, and Famines in Bengal to the Notes directory.
</commit_message>
<xml_diff>
--- a/Notes/HST 103_T2.pptx
+++ b/Notes/HST 103_T2.pptx
@@ -6379,7 +6379,7 @@
           <a:p>
             <a:fld id="{195D72BD-19E3-48F9-B345-202E886ADAB2}" type="datetimeFigureOut">
               <a:rPr lang="en-US" smtClean="0"/>
-              <a:t>07-Jul-25</a:t>
+              <a:t>23-Jul-25</a:t>
             </a:fld>
             <a:endParaRPr lang="en-US"/>
           </a:p>
@@ -6954,7 +6954,7 @@
           <a:p>
             <a:fld id="{2B79540F-A09C-4FBB-A50D-FDF6FACF6E5E}" type="datetimeFigureOut">
               <a:rPr lang="en-US" smtClean="0"/>
-              <a:t>07-Jul-25</a:t>
+              <a:t>23-Jul-25</a:t>
             </a:fld>
             <a:endParaRPr lang="en-US"/>
           </a:p>
@@ -7122,7 +7122,7 @@
           <a:p>
             <a:fld id="{2B79540F-A09C-4FBB-A50D-FDF6FACF6E5E}" type="datetimeFigureOut">
               <a:rPr lang="en-US" smtClean="0"/>
-              <a:t>07-Jul-25</a:t>
+              <a:t>23-Jul-25</a:t>
             </a:fld>
             <a:endParaRPr lang="en-US"/>
           </a:p>
@@ -7300,7 +7300,7 @@
           <a:p>
             <a:fld id="{2B79540F-A09C-4FBB-A50D-FDF6FACF6E5E}" type="datetimeFigureOut">
               <a:rPr lang="en-US" smtClean="0"/>
-              <a:t>07-Jul-25</a:t>
+              <a:t>23-Jul-25</a:t>
             </a:fld>
             <a:endParaRPr lang="en-US"/>
           </a:p>
@@ -7468,7 +7468,7 @@
           <a:p>
             <a:fld id="{2B79540F-A09C-4FBB-A50D-FDF6FACF6E5E}" type="datetimeFigureOut">
               <a:rPr lang="en-US" smtClean="0"/>
-              <a:t>07-Jul-25</a:t>
+              <a:t>23-Jul-25</a:t>
             </a:fld>
             <a:endParaRPr lang="en-US"/>
           </a:p>
@@ -7713,7 +7713,7 @@
           <a:p>
             <a:fld id="{2B79540F-A09C-4FBB-A50D-FDF6FACF6E5E}" type="datetimeFigureOut">
               <a:rPr lang="en-US" smtClean="0"/>
-              <a:t>07-Jul-25</a:t>
+              <a:t>23-Jul-25</a:t>
             </a:fld>
             <a:endParaRPr lang="en-US"/>
           </a:p>
@@ -7942,7 +7942,7 @@
           <a:p>
             <a:fld id="{2B79540F-A09C-4FBB-A50D-FDF6FACF6E5E}" type="datetimeFigureOut">
               <a:rPr lang="en-US" smtClean="0"/>
-              <a:t>07-Jul-25</a:t>
+              <a:t>23-Jul-25</a:t>
             </a:fld>
             <a:endParaRPr lang="en-US"/>
           </a:p>
@@ -8306,7 +8306,7 @@
           <a:p>
             <a:fld id="{2B79540F-A09C-4FBB-A50D-FDF6FACF6E5E}" type="datetimeFigureOut">
               <a:rPr lang="en-US" smtClean="0"/>
-              <a:t>07-Jul-25</a:t>
+              <a:t>23-Jul-25</a:t>
             </a:fld>
             <a:endParaRPr lang="en-US"/>
           </a:p>
@@ -8423,7 +8423,7 @@
           <a:p>
             <a:fld id="{2B79540F-A09C-4FBB-A50D-FDF6FACF6E5E}" type="datetimeFigureOut">
               <a:rPr lang="en-US" smtClean="0"/>
-              <a:t>07-Jul-25</a:t>
+              <a:t>23-Jul-25</a:t>
             </a:fld>
             <a:endParaRPr lang="en-US"/>
           </a:p>
@@ -8518,7 +8518,7 @@
           <a:p>
             <a:fld id="{2B79540F-A09C-4FBB-A50D-FDF6FACF6E5E}" type="datetimeFigureOut">
               <a:rPr lang="en-US" smtClean="0"/>
-              <a:t>07-Jul-25</a:t>
+              <a:t>23-Jul-25</a:t>
             </a:fld>
             <a:endParaRPr lang="en-US"/>
           </a:p>
@@ -8793,7 +8793,7 @@
           <a:p>
             <a:fld id="{2B79540F-A09C-4FBB-A50D-FDF6FACF6E5E}" type="datetimeFigureOut">
               <a:rPr lang="en-US" smtClean="0"/>
-              <a:t>07-Jul-25</a:t>
+              <a:t>23-Jul-25</a:t>
             </a:fld>
             <a:endParaRPr lang="en-US"/>
           </a:p>
@@ -9045,7 +9045,7 @@
           <a:p>
             <a:fld id="{2B79540F-A09C-4FBB-A50D-FDF6FACF6E5E}" type="datetimeFigureOut">
               <a:rPr lang="en-US" smtClean="0"/>
-              <a:t>07-Jul-25</a:t>
+              <a:t>23-Jul-25</a:t>
             </a:fld>
             <a:endParaRPr lang="en-US"/>
           </a:p>
@@ -9256,7 +9256,7 @@
           <a:p>
             <a:fld id="{2B79540F-A09C-4FBB-A50D-FDF6FACF6E5E}" type="datetimeFigureOut">
               <a:rPr lang="en-US" smtClean="0"/>
-              <a:t>07-Jul-25</a:t>
+              <a:t>23-Jul-25</a:t>
             </a:fld>
             <a:endParaRPr lang="en-US"/>
           </a:p>
@@ -9671,10 +9671,10 @@
       </p:grpSpPr>
       <p:sp useBgFill="1">
         <p:nvSpPr>
-          <p:cNvPr id="18" name="Rectangle 17">
+          <p:cNvPr id="23" name="Rectangle 22">
             <a:extLst>
               <a:ext uri="{FF2B5EF4-FFF2-40B4-BE49-F238E27FC236}">
-                <a16:creationId xmlns:a16="http://schemas.microsoft.com/office/drawing/2014/main" id="{A3E8498D-DA8F-EF6C-5420-F153D4979209}"/>
+                <a16:creationId xmlns:a16="http://schemas.microsoft.com/office/drawing/2014/main" id="{FFD48BC7-DC40-47DE-87EE-9F4B6ECB9ABB}"/>
               </a:ext>
               <a:ext uri="{C183D7F6-B498-43B3-948B-1728B52AA6E4}">
                 <adec:decorative xmlns:adec="http://schemas.microsoft.com/office/drawing/2017/decorative" val="1"/>
@@ -9700,30 +9700,14 @@
           <a:prstGeom prst="rect">
             <a:avLst/>
           </a:prstGeom>
-          <a:ln w="12700" cap="flat" cmpd="sng" algn="ctr">
+          <a:ln>
             <a:noFill/>
-            <a:prstDash val="solid"/>
-            <a:miter lim="800000"/>
           </a:ln>
-          <a:effectLst/>
-          <a:extLst>
-            <a:ext uri="{91240B29-F687-4F45-9708-019B960494DF}">
-              <a14:hiddenLine xmlns:a14="http://schemas.microsoft.com/office/drawing/2010/main" w="12700" cap="flat" cmpd="sng" algn="ctr">
-                <a:solidFill>
-                  <a:schemeClr val="accent1">
-                    <a:shade val="15000"/>
-                  </a:schemeClr>
-                </a:solidFill>
-                <a:prstDash val="solid"/>
-                <a:miter lim="800000"/>
-              </a14:hiddenLine>
-            </a:ext>
-          </a:extLst>
         </p:spPr>
         <p:style>
           <a:lnRef idx="2">
             <a:schemeClr val="accent1">
-              <a:shade val="15000"/>
+              <a:shade val="50000"/>
             </a:schemeClr>
           </a:lnRef>
           <a:fillRef idx="1">
@@ -9741,7 +9725,398 @@
           <a:lstStyle/>
           <a:p>
             <a:pPr algn="ctr"/>
-            <a:endParaRPr lang="en-US" dirty="0"/>
+            <a:endParaRPr lang="en-US"/>
+          </a:p>
+        </p:txBody>
+      </p:sp>
+      <p:sp useBgFill="1">
+        <p:nvSpPr>
+          <p:cNvPr id="25" name="Freeform: Shape 24">
+            <a:extLst>
+              <a:ext uri="{FF2B5EF4-FFF2-40B4-BE49-F238E27FC236}">
+                <a16:creationId xmlns:a16="http://schemas.microsoft.com/office/drawing/2014/main" id="{E502BBC7-2C76-46F3-BC24-5985BC13DB88}"/>
+              </a:ext>
+              <a:ext uri="{C183D7F6-B498-43B3-948B-1728B52AA6E4}">
+                <adec:decorative xmlns:adec="http://schemas.microsoft.com/office/drawing/2017/decorative" val="1"/>
+              </a:ext>
+            </a:extLst>
+          </p:cNvPr>
+          <p:cNvSpPr>
+            <a:spLocks noGrp="1" noRot="1" noChangeAspect="1" noMove="1" noResize="1" noEditPoints="1" noAdjustHandles="1" noChangeArrowheads="1" noChangeShapeType="1" noTextEdit="1"/>
+          </p:cNvSpPr>
+          <p:nvPr>
+            <p:extLst>
+              <p:ext uri="{386F3935-93C4-4BCD-93E2-E3B085C9AB24}">
+                <p16:designElem xmlns:p16="http://schemas.microsoft.com/office/powerpoint/2015/main" val="1"/>
+              </p:ext>
+            </p:extLst>
+          </p:nvPr>
+        </p:nvSpPr>
+        <p:spPr>
+          <a:xfrm>
+            <a:off x="1114425" y="0"/>
+            <a:ext cx="9963150" cy="6858000"/>
+          </a:xfrm>
+          <a:custGeom>
+            <a:avLst/>
+            <a:gdLst>
+              <a:gd name="connsiteX0" fmla="*/ 1595771 w 9963150"/>
+              <a:gd name="connsiteY0" fmla="*/ 0 h 6858000"/>
+              <a:gd name="connsiteX1" fmla="*/ 8367379 w 9963150"/>
+              <a:gd name="connsiteY1" fmla="*/ 0 h 6858000"/>
+              <a:gd name="connsiteX2" fmla="*/ 8504080 w 9963150"/>
+              <a:gd name="connsiteY2" fmla="*/ 130333 h 6858000"/>
+              <a:gd name="connsiteX3" fmla="*/ 9963150 w 9963150"/>
+              <a:gd name="connsiteY3" fmla="*/ 3652838 h 6858000"/>
+              <a:gd name="connsiteX4" fmla="*/ 8825600 w 9963150"/>
+              <a:gd name="connsiteY4" fmla="*/ 6821583 h 6858000"/>
+              <a:gd name="connsiteX5" fmla="*/ 8794055 w 9963150"/>
+              <a:gd name="connsiteY5" fmla="*/ 6858000 h 6858000"/>
+              <a:gd name="connsiteX6" fmla="*/ 1169096 w 9963150"/>
+              <a:gd name="connsiteY6" fmla="*/ 6858000 h 6858000"/>
+              <a:gd name="connsiteX7" fmla="*/ 1137550 w 9963150"/>
+              <a:gd name="connsiteY7" fmla="*/ 6821583 h 6858000"/>
+              <a:gd name="connsiteX8" fmla="*/ 0 w 9963150"/>
+              <a:gd name="connsiteY8" fmla="*/ 3652838 h 6858000"/>
+              <a:gd name="connsiteX9" fmla="*/ 1459070 w 9963150"/>
+              <a:gd name="connsiteY9" fmla="*/ 130333 h 6858000"/>
+            </a:gdLst>
+            <a:ahLst/>
+            <a:cxnLst>
+              <a:cxn ang="0">
+                <a:pos x="connsiteX0" y="connsiteY0"/>
+              </a:cxn>
+              <a:cxn ang="0">
+                <a:pos x="connsiteX1" y="connsiteY1"/>
+              </a:cxn>
+              <a:cxn ang="0">
+                <a:pos x="connsiteX2" y="connsiteY2"/>
+              </a:cxn>
+              <a:cxn ang="0">
+                <a:pos x="connsiteX3" y="connsiteY3"/>
+              </a:cxn>
+              <a:cxn ang="0">
+                <a:pos x="connsiteX4" y="connsiteY4"/>
+              </a:cxn>
+              <a:cxn ang="0">
+                <a:pos x="connsiteX5" y="connsiteY5"/>
+              </a:cxn>
+              <a:cxn ang="0">
+                <a:pos x="connsiteX6" y="connsiteY6"/>
+              </a:cxn>
+              <a:cxn ang="0">
+                <a:pos x="connsiteX7" y="connsiteY7"/>
+              </a:cxn>
+              <a:cxn ang="0">
+                <a:pos x="connsiteX8" y="connsiteY8"/>
+              </a:cxn>
+              <a:cxn ang="0">
+                <a:pos x="connsiteX9" y="connsiteY9"/>
+              </a:cxn>
+            </a:cxnLst>
+            <a:rect l="l" t="t" r="r" b="b"/>
+            <a:pathLst>
+              <a:path w="9963150" h="6858000">
+                <a:moveTo>
+                  <a:pt x="1595771" y="0"/>
+                </a:moveTo>
+                <a:lnTo>
+                  <a:pt x="8367379" y="0"/>
+                </a:lnTo>
+                <a:lnTo>
+                  <a:pt x="8504080" y="130333"/>
+                </a:lnTo>
+                <a:cubicBezTo>
+                  <a:pt x="9405568" y="1031820"/>
+                  <a:pt x="9963150" y="2277214"/>
+                  <a:pt x="9963150" y="3652838"/>
+                </a:cubicBezTo>
+                <a:cubicBezTo>
+                  <a:pt x="9963150" y="4856509"/>
+                  <a:pt x="9536251" y="5960473"/>
+                  <a:pt x="8825600" y="6821583"/>
+                </a:cubicBezTo>
+                <a:lnTo>
+                  <a:pt x="8794055" y="6858000"/>
+                </a:lnTo>
+                <a:lnTo>
+                  <a:pt x="1169096" y="6858000"/>
+                </a:lnTo>
+                <a:lnTo>
+                  <a:pt x="1137550" y="6821583"/>
+                </a:lnTo>
+                <a:cubicBezTo>
+                  <a:pt x="426899" y="5960473"/>
+                  <a:pt x="0" y="4856509"/>
+                  <a:pt x="0" y="3652838"/>
+                </a:cubicBezTo>
+                <a:cubicBezTo>
+                  <a:pt x="0" y="2277214"/>
+                  <a:pt x="557582" y="1031820"/>
+                  <a:pt x="1459070" y="130333"/>
+                </a:cubicBezTo>
+                <a:close/>
+              </a:path>
+            </a:pathLst>
+          </a:custGeom>
+          <a:ln w="9525">
+            <a:solidFill>
+              <a:srgbClr val="EFEFEF"/>
+            </a:solidFill>
+          </a:ln>
+          <a:effectLst>
+            <a:outerShdw blurRad="139700" sx="102000" sy="102000" algn="ctr" rotWithShape="0">
+              <a:schemeClr val="bg1">
+                <a:lumMod val="85000"/>
+                <a:alpha val="38000"/>
+              </a:schemeClr>
+            </a:outerShdw>
+          </a:effectLst>
+        </p:spPr>
+        <p:style>
+          <a:lnRef idx="2">
+            <a:schemeClr val="accent1">
+              <a:shade val="50000"/>
+            </a:schemeClr>
+          </a:lnRef>
+          <a:fillRef idx="1">
+            <a:schemeClr val="accent1"/>
+          </a:fillRef>
+          <a:effectRef idx="0">
+            <a:schemeClr val="accent1"/>
+          </a:effectRef>
+          <a:fontRef idx="minor">
+            <a:schemeClr val="lt1"/>
+          </a:fontRef>
+        </p:style>
+        <p:txBody>
+          <a:bodyPr wrap="square" rtlCol="0" anchor="ctr">
+            <a:noAutofit/>
+          </a:bodyPr>
+          <a:lstStyle/>
+          <a:p>
+            <a:pPr marL="0" marR="0" lvl="0" indent="0" algn="ctr" defTabSz="914400" rtl="0" eaLnBrk="1" fontAlgn="auto" latinLnBrk="0" hangingPunct="1">
+              <a:lnSpc>
+                <a:spcPct val="100000"/>
+              </a:lnSpc>
+              <a:spcBef>
+                <a:spcPts val="0"/>
+              </a:spcBef>
+              <a:spcAft>
+                <a:spcPts val="0"/>
+              </a:spcAft>
+              <a:buClrTx/>
+              <a:buSzTx/>
+              <a:buFontTx/>
+              <a:buNone/>
+              <a:tabLst/>
+              <a:defRPr/>
+            </a:pPr>
+            <a:endParaRPr kumimoji="0" lang="en-US" sz="1800" b="0" i="0" u="none" strike="noStrike" kern="1200" cap="none" spc="0" normalizeH="0" baseline="0" noProof="0">
+              <a:ln>
+                <a:noFill/>
+              </a:ln>
+              <a:solidFill>
+                <a:prstClr val="white"/>
+              </a:solidFill>
+              <a:effectLst/>
+              <a:uLnTx/>
+              <a:uFillTx/>
+              <a:latin typeface="Calibri" panose="020F0502020204030204"/>
+              <a:ea typeface="+mn-ea"/>
+              <a:cs typeface="+mn-cs"/>
+            </a:endParaRPr>
+          </a:p>
+        </p:txBody>
+      </p:sp>
+      <p:sp useBgFill="1">
+        <p:nvSpPr>
+          <p:cNvPr id="27" name="Freeform: Shape 26">
+            <a:extLst>
+              <a:ext uri="{FF2B5EF4-FFF2-40B4-BE49-F238E27FC236}">
+                <a16:creationId xmlns:a16="http://schemas.microsoft.com/office/drawing/2014/main" id="{C7F28D52-2A5F-4D23-81AE-7CB8B591C7AF}"/>
+              </a:ext>
+              <a:ext uri="{C183D7F6-B498-43B3-948B-1728B52AA6E4}">
+                <adec:decorative xmlns:adec="http://schemas.microsoft.com/office/drawing/2017/decorative" val="1"/>
+              </a:ext>
+            </a:extLst>
+          </p:cNvPr>
+          <p:cNvSpPr>
+            <a:spLocks noGrp="1" noRot="1" noChangeAspect="1" noMove="1" noResize="1" noEditPoints="1" noAdjustHandles="1" noChangeArrowheads="1" noChangeShapeType="1" noTextEdit="1"/>
+          </p:cNvSpPr>
+          <p:nvPr>
+            <p:extLst>
+              <p:ext uri="{386F3935-93C4-4BCD-93E2-E3B085C9AB24}">
+                <p16:designElem xmlns:p16="http://schemas.microsoft.com/office/powerpoint/2015/main" val="1"/>
+              </p:ext>
+            </p:extLst>
+          </p:nvPr>
+        </p:nvSpPr>
+        <p:spPr>
+          <a:xfrm>
+            <a:off x="1121664" y="0"/>
+            <a:ext cx="9948672" cy="6858000"/>
+          </a:xfrm>
+          <a:custGeom>
+            <a:avLst/>
+            <a:gdLst>
+              <a:gd name="connsiteX0" fmla="*/ 1595771 w 9963150"/>
+              <a:gd name="connsiteY0" fmla="*/ 0 h 6858000"/>
+              <a:gd name="connsiteX1" fmla="*/ 8367379 w 9963150"/>
+              <a:gd name="connsiteY1" fmla="*/ 0 h 6858000"/>
+              <a:gd name="connsiteX2" fmla="*/ 8504080 w 9963150"/>
+              <a:gd name="connsiteY2" fmla="*/ 130333 h 6858000"/>
+              <a:gd name="connsiteX3" fmla="*/ 9963150 w 9963150"/>
+              <a:gd name="connsiteY3" fmla="*/ 3652838 h 6858000"/>
+              <a:gd name="connsiteX4" fmla="*/ 8825600 w 9963150"/>
+              <a:gd name="connsiteY4" fmla="*/ 6821583 h 6858000"/>
+              <a:gd name="connsiteX5" fmla="*/ 8794055 w 9963150"/>
+              <a:gd name="connsiteY5" fmla="*/ 6858000 h 6858000"/>
+              <a:gd name="connsiteX6" fmla="*/ 1169096 w 9963150"/>
+              <a:gd name="connsiteY6" fmla="*/ 6858000 h 6858000"/>
+              <a:gd name="connsiteX7" fmla="*/ 1137550 w 9963150"/>
+              <a:gd name="connsiteY7" fmla="*/ 6821583 h 6858000"/>
+              <a:gd name="connsiteX8" fmla="*/ 0 w 9963150"/>
+              <a:gd name="connsiteY8" fmla="*/ 3652838 h 6858000"/>
+              <a:gd name="connsiteX9" fmla="*/ 1459070 w 9963150"/>
+              <a:gd name="connsiteY9" fmla="*/ 130333 h 6858000"/>
+            </a:gdLst>
+            <a:ahLst/>
+            <a:cxnLst>
+              <a:cxn ang="0">
+                <a:pos x="connsiteX0" y="connsiteY0"/>
+              </a:cxn>
+              <a:cxn ang="0">
+                <a:pos x="connsiteX1" y="connsiteY1"/>
+              </a:cxn>
+              <a:cxn ang="0">
+                <a:pos x="connsiteX2" y="connsiteY2"/>
+              </a:cxn>
+              <a:cxn ang="0">
+                <a:pos x="connsiteX3" y="connsiteY3"/>
+              </a:cxn>
+              <a:cxn ang="0">
+                <a:pos x="connsiteX4" y="connsiteY4"/>
+              </a:cxn>
+              <a:cxn ang="0">
+                <a:pos x="connsiteX5" y="connsiteY5"/>
+              </a:cxn>
+              <a:cxn ang="0">
+                <a:pos x="connsiteX6" y="connsiteY6"/>
+              </a:cxn>
+              <a:cxn ang="0">
+                <a:pos x="connsiteX7" y="connsiteY7"/>
+              </a:cxn>
+              <a:cxn ang="0">
+                <a:pos x="connsiteX8" y="connsiteY8"/>
+              </a:cxn>
+              <a:cxn ang="0">
+                <a:pos x="connsiteX9" y="connsiteY9"/>
+              </a:cxn>
+            </a:cxnLst>
+            <a:rect l="l" t="t" r="r" b="b"/>
+            <a:pathLst>
+              <a:path w="9963150" h="6858000">
+                <a:moveTo>
+                  <a:pt x="1595771" y="0"/>
+                </a:moveTo>
+                <a:lnTo>
+                  <a:pt x="8367379" y="0"/>
+                </a:lnTo>
+                <a:lnTo>
+                  <a:pt x="8504080" y="130333"/>
+                </a:lnTo>
+                <a:cubicBezTo>
+                  <a:pt x="9405568" y="1031820"/>
+                  <a:pt x="9963150" y="2277214"/>
+                  <a:pt x="9963150" y="3652838"/>
+                </a:cubicBezTo>
+                <a:cubicBezTo>
+                  <a:pt x="9963150" y="4856509"/>
+                  <a:pt x="9536251" y="5960473"/>
+                  <a:pt x="8825600" y="6821583"/>
+                </a:cubicBezTo>
+                <a:lnTo>
+                  <a:pt x="8794055" y="6858000"/>
+                </a:lnTo>
+                <a:lnTo>
+                  <a:pt x="1169096" y="6858000"/>
+                </a:lnTo>
+                <a:lnTo>
+                  <a:pt x="1137550" y="6821583"/>
+                </a:lnTo>
+                <a:cubicBezTo>
+                  <a:pt x="426899" y="5960473"/>
+                  <a:pt x="0" y="4856509"/>
+                  <a:pt x="0" y="3652838"/>
+                </a:cubicBezTo>
+                <a:cubicBezTo>
+                  <a:pt x="0" y="2277214"/>
+                  <a:pt x="557582" y="1031820"/>
+                  <a:pt x="1459070" y="130333"/>
+                </a:cubicBezTo>
+                <a:close/>
+              </a:path>
+            </a:pathLst>
+          </a:custGeom>
+          <a:ln w="9525">
+            <a:noFill/>
+          </a:ln>
+          <a:effectLst/>
+        </p:spPr>
+        <p:style>
+          <a:lnRef idx="2">
+            <a:schemeClr val="accent1">
+              <a:shade val="50000"/>
+            </a:schemeClr>
+          </a:lnRef>
+          <a:fillRef idx="1">
+            <a:schemeClr val="accent1"/>
+          </a:fillRef>
+          <a:effectRef idx="0">
+            <a:schemeClr val="accent1"/>
+          </a:effectRef>
+          <a:fontRef idx="minor">
+            <a:schemeClr val="lt1"/>
+          </a:fontRef>
+        </p:style>
+        <p:txBody>
+          <a:bodyPr wrap="square" rtlCol="0" anchor="ctr">
+            <a:noAutofit/>
+          </a:bodyPr>
+          <a:lstStyle/>
+          <a:p>
+            <a:pPr marL="0" marR="0" lvl="0" indent="0" algn="ctr" defTabSz="914400" rtl="0" eaLnBrk="1" fontAlgn="auto" latinLnBrk="0" hangingPunct="1">
+              <a:lnSpc>
+                <a:spcPct val="100000"/>
+              </a:lnSpc>
+              <a:spcBef>
+                <a:spcPts val="0"/>
+              </a:spcBef>
+              <a:spcAft>
+                <a:spcPts val="0"/>
+              </a:spcAft>
+              <a:buClrTx/>
+              <a:buSzTx/>
+              <a:buFontTx/>
+              <a:buNone/>
+              <a:tabLst/>
+              <a:defRPr/>
+            </a:pPr>
+            <a:endParaRPr kumimoji="0" lang="en-US" sz="1800" b="0" i="0" u="none" strike="noStrike" kern="1200" cap="none" spc="0" normalizeH="0" baseline="0" noProof="0">
+              <a:ln>
+                <a:noFill/>
+              </a:ln>
+              <a:solidFill>
+                <a:prstClr val="white"/>
+              </a:solidFill>
+              <a:effectLst/>
+              <a:uLnTx/>
+              <a:uFillTx/>
+              <a:latin typeface="Calibri" panose="020F0502020204030204"/>
+              <a:ea typeface="+mn-ea"/>
+              <a:cs typeface="+mn-cs"/>
+            </a:endParaRPr>
           </a:p>
         </p:txBody>
       </p:sp>
@@ -9757,19 +10132,18 @@
         </p:nvSpPr>
         <p:spPr>
           <a:xfrm>
-            <a:off x="618007" y="548643"/>
-            <a:ext cx="6424690" cy="3635797"/>
+            <a:off x="1524003" y="1999615"/>
+            <a:ext cx="9144000" cy="2764028"/>
           </a:xfrm>
         </p:spPr>
         <p:txBody>
-          <a:bodyPr anchor="t">
+          <a:bodyPr anchor="ctr">
             <a:normAutofit/>
           </a:bodyPr>
           <a:lstStyle/>
           <a:p>
-            <a:pPr algn="l"/>
             <a:r>
-              <a:rPr lang="en-US">
+              <a:rPr lang="en-US" sz="7200">
                 <a:latin typeface="Arial Black" panose="020B0A04020102020204" pitchFamily="34" charset="0"/>
               </a:rPr>
               <a:t>History of Bangladesh</a:t>
@@ -9789,28 +10163,118 @@
         </p:nvSpPr>
         <p:spPr>
           <a:xfrm>
-            <a:off x="618007" y="4453813"/>
-            <a:ext cx="6424690" cy="1461794"/>
+            <a:off x="1966912" y="5645150"/>
+            <a:ext cx="8258176" cy="631825"/>
           </a:xfrm>
         </p:spPr>
         <p:txBody>
-          <a:bodyPr anchor="b">
+          <a:bodyPr anchor="ctr">
             <a:normAutofit/>
           </a:bodyPr>
           <a:lstStyle/>
           <a:p>
-            <a:pPr algn="l"/>
             <a:r>
-              <a:rPr lang="en-US" sz="2000"/>
+              <a:rPr lang="en-US" sz="1500"/>
               <a:t>HST 103</a:t>
             </a:r>
           </a:p>
           <a:p>
-            <a:pPr algn="l"/>
             <a:r>
-              <a:rPr lang="en-US" sz="2000"/>
+              <a:rPr lang="en-US" sz="1500"/>
               <a:t>T. 2 Geography and Environment</a:t>
             </a:r>
+          </a:p>
+        </p:txBody>
+      </p:sp>
+      <p:sp>
+        <p:nvSpPr>
+          <p:cNvPr id="29" name="Rectangle 28">
+            <a:extLst>
+              <a:ext uri="{FF2B5EF4-FFF2-40B4-BE49-F238E27FC236}">
+                <a16:creationId xmlns:a16="http://schemas.microsoft.com/office/drawing/2014/main" id="{3629484E-3792-4B3D-89AD-7C8A1ED0E0D4}"/>
+              </a:ext>
+              <a:ext uri="{C183D7F6-B498-43B3-948B-1728B52AA6E4}">
+                <adec:decorative xmlns:adec="http://schemas.microsoft.com/office/drawing/2017/decorative" val="1"/>
+              </a:ext>
+            </a:extLst>
+          </p:cNvPr>
+          <p:cNvSpPr>
+            <a:spLocks noGrp="1" noRot="1" noChangeAspect="1" noMove="1" noResize="1" noEditPoints="1" noAdjustHandles="1" noChangeArrowheads="1" noChangeShapeType="1" noTextEdit="1"/>
+          </p:cNvSpPr>
+          <p:nvPr>
+            <p:extLst>
+              <p:ext uri="{386F3935-93C4-4BCD-93E2-E3B085C9AB24}">
+                <p16:designElem xmlns:p16="http://schemas.microsoft.com/office/powerpoint/2015/main" val="1"/>
+              </p:ext>
+            </p:extLst>
+          </p:nvPr>
+        </p:nvSpPr>
+        <p:spPr>
+          <a:xfrm>
+            <a:off x="3718560" y="5524786"/>
+            <a:ext cx="4754880" cy="27432"/>
+          </a:xfrm>
+          <a:prstGeom prst="rect">
+            <a:avLst/>
+          </a:prstGeom>
+          <a:solidFill>
+            <a:schemeClr val="accent2"/>
+          </a:solidFill>
+          <a:ln>
+            <a:noFill/>
+          </a:ln>
+        </p:spPr>
+        <p:style>
+          <a:lnRef idx="2">
+            <a:schemeClr val="accent1">
+              <a:shade val="50000"/>
+            </a:schemeClr>
+          </a:lnRef>
+          <a:fillRef idx="1">
+            <a:schemeClr val="accent1"/>
+          </a:fillRef>
+          <a:effectRef idx="0">
+            <a:schemeClr val="accent1"/>
+          </a:effectRef>
+          <a:fontRef idx="minor">
+            <a:schemeClr val="lt1"/>
+          </a:fontRef>
+        </p:style>
+        <p:txBody>
+          <a:bodyPr rtlCol="0" anchor="ctr"/>
+          <a:lstStyle/>
+          <a:p>
+            <a:pPr marL="0" marR="0" lvl="0" indent="0" algn="ctr" defTabSz="914400" rtl="0" eaLnBrk="1" fontAlgn="auto" latinLnBrk="0" hangingPunct="1">
+              <a:lnSpc>
+                <a:spcPct val="100000"/>
+              </a:lnSpc>
+              <a:spcBef>
+                <a:spcPts val="0"/>
+              </a:spcBef>
+              <a:spcAft>
+                <a:spcPts val="0"/>
+              </a:spcAft>
+              <a:buClrTx/>
+              <a:buSzTx/>
+              <a:buFontTx/>
+              <a:buNone/>
+              <a:tabLst/>
+              <a:defRPr/>
+            </a:pPr>
+            <a:endParaRPr kumimoji="0" lang="en-US" sz="1800" b="0" i="0" u="none" strike="noStrike" kern="1200" cap="none" spc="0" normalizeH="0" baseline="0" noProof="0">
+              <a:ln>
+                <a:noFill/>
+              </a:ln>
+              <a:solidFill>
+                <a:prstClr val="white"/>
+              </a:solidFill>
+              <a:effectLst/>
+              <a:uLnTx/>
+              <a:uFillTx/>
+              <a:latin typeface="Calibri" panose="020F0502020204030204"/>
+              <a:ea typeface="+mn-ea"/>
+              <a:cs typeface="+mn-cs"/>
+            </a:endParaRPr>
           </a:p>
         </p:txBody>
       </p:sp>
@@ -10973,12 +11437,12 @@
           <a:chExt cx="0" cy="0"/>
         </a:xfrm>
       </p:grpSpPr>
-      <p:sp>
+      <p:sp useBgFill="1">
         <p:nvSpPr>
-          <p:cNvPr id="8" name="Rectangle 7">
+          <p:cNvPr id="15" name="Rectangle 14">
             <a:extLst>
               <a:ext uri="{FF2B5EF4-FFF2-40B4-BE49-F238E27FC236}">
-                <a16:creationId xmlns:a16="http://schemas.microsoft.com/office/drawing/2014/main" id="{20E7A827-4DD7-8A5A-4519-32BDA5CDBA31}"/>
+                <a16:creationId xmlns:a16="http://schemas.microsoft.com/office/drawing/2014/main" id="{CBB2B1F0-0DD6-4744-9A46-7A344FB48E40}"/>
               </a:ext>
               <a:ext uri="{C183D7F6-B498-43B3-948B-1728B52AA6E4}">
                 <adec:decorative xmlns:adec="http://schemas.microsoft.com/office/drawing/2017/decorative" val="1"/>
@@ -11004,33 +11468,14 @@
           <a:prstGeom prst="rect">
             <a:avLst/>
           </a:prstGeom>
-          <a:solidFill>
-            <a:schemeClr val="bg1"/>
-          </a:solidFill>
-          <a:ln w="12700" cap="flat" cmpd="sng" algn="ctr">
+          <a:ln>
             <a:noFill/>
-            <a:prstDash val="solid"/>
-            <a:miter lim="800000"/>
           </a:ln>
-          <a:effectLst/>
-          <a:extLst>
-            <a:ext uri="{91240B29-F687-4F45-9708-019B960494DF}">
-              <a14:hiddenLine xmlns:a14="http://schemas.microsoft.com/office/drawing/2010/main" w="12700" cap="flat" cmpd="sng" algn="ctr">
-                <a:solidFill>
-                  <a:schemeClr val="accent1">
-                    <a:shade val="15000"/>
-                  </a:schemeClr>
-                </a:solidFill>
-                <a:prstDash val="solid"/>
-                <a:miter lim="800000"/>
-              </a14:hiddenLine>
-            </a:ext>
-          </a:extLst>
         </p:spPr>
         <p:style>
           <a:lnRef idx="2">
             <a:schemeClr val="accent1">
-              <a:shade val="15000"/>
+              <a:shade val="50000"/>
             </a:schemeClr>
           </a:lnRef>
           <a:fillRef idx="1">
@@ -11052,12 +11497,43 @@
           </a:p>
         </p:txBody>
       </p:sp>
-      <p:sp useBgFill="1">
+      <p:sp>
         <p:nvSpPr>
-          <p:cNvPr id="10" name="Rectangle 9">
+          <p:cNvPr id="2" name="Title 1"/>
+          <p:cNvSpPr>
+            <a:spLocks noGrp="1"/>
+          </p:cNvSpPr>
+          <p:nvPr>
+            <p:ph type="title"/>
+          </p:nvPr>
+        </p:nvSpPr>
+        <p:spPr>
+          <a:xfrm>
+            <a:off x="841248" y="426720"/>
+            <a:ext cx="10506456" cy="1919141"/>
+          </a:xfrm>
+        </p:spPr>
+        <p:txBody>
+          <a:bodyPr anchor="b">
+            <a:normAutofit/>
+          </a:bodyPr>
+          <a:lstStyle/>
+          <a:p>
+            <a:r>
+              <a:rPr lang="en-US" sz="5600">
+                <a:latin typeface="Arial Black" panose="020B0A04020102020204" pitchFamily="34" charset="0"/>
+              </a:rPr>
+              <a:t>Impact of Geography and physical Environment </a:t>
+            </a:r>
+          </a:p>
+        </p:txBody>
+      </p:sp>
+      <p:sp>
+        <p:nvSpPr>
+          <p:cNvPr id="17" name="Rectangle 16">
             <a:extLst>
               <a:ext uri="{FF2B5EF4-FFF2-40B4-BE49-F238E27FC236}">
-                <a16:creationId xmlns:a16="http://schemas.microsoft.com/office/drawing/2014/main" id="{1A75348D-3376-10BB-E89D-A72720D88A92}"/>
+                <a16:creationId xmlns:a16="http://schemas.microsoft.com/office/drawing/2014/main" id="{52D502E5-F6B4-4D58-B4AE-FC466FF15EE8}"/>
               </a:ext>
               <a:ext uri="{C183D7F6-B498-43B3-948B-1728B52AA6E4}">
                 <adec:decorative xmlns:adec="http://schemas.microsoft.com/office/drawing/2017/decorative" val="1"/>
@@ -11077,36 +11553,24 @@
         </p:nvSpPr>
         <p:spPr>
           <a:xfrm>
-            <a:off x="0" y="0"/>
-            <a:ext cx="12192000" cy="6858000"/>
+            <a:off x="865953" y="2899927"/>
+            <a:ext cx="10451592" cy="18288"/>
           </a:xfrm>
           <a:prstGeom prst="rect">
             <a:avLst/>
           </a:prstGeom>
-          <a:ln w="12700" cap="flat" cmpd="sng" algn="ctr">
+          <a:solidFill>
+            <a:srgbClr val="D5D5D5"/>
+          </a:solidFill>
+          <a:ln w="3175">
             <a:noFill/>
-            <a:prstDash val="solid"/>
-            <a:miter lim="800000"/>
           </a:ln>
           <a:effectLst/>
-          <a:extLst>
-            <a:ext uri="{91240B29-F687-4F45-9708-019B960494DF}">
-              <a14:hiddenLine xmlns:a14="http://schemas.microsoft.com/office/drawing/2010/main" w="12700" cap="flat" cmpd="sng" algn="ctr">
-                <a:solidFill>
-                  <a:schemeClr val="accent1">
-                    <a:shade val="15000"/>
-                  </a:schemeClr>
-                </a:solidFill>
-                <a:prstDash val="solid"/>
-                <a:miter lim="800000"/>
-              </a14:hiddenLine>
-            </a:ext>
-          </a:extLst>
         </p:spPr>
         <p:style>
           <a:lnRef idx="2">
             <a:schemeClr val="accent1">
-              <a:shade val="15000"/>
+              <a:shade val="50000"/>
             </a:schemeClr>
           </a:lnRef>
           <a:fillRef idx="1">
@@ -11124,38 +11588,80 @@
           <a:lstStyle/>
           <a:p>
             <a:pPr algn="ctr"/>
-            <a:endParaRPr lang="en-US"/>
+            <a:endParaRPr lang="en-US">
+              <a:solidFill>
+                <a:prstClr val="white"/>
+              </a:solidFill>
+              <a:latin typeface="Calibri" panose="020F0502020204030204"/>
+            </a:endParaRPr>
           </a:p>
         </p:txBody>
       </p:sp>
       <p:sp>
         <p:nvSpPr>
-          <p:cNvPr id="2" name="Title 1"/>
+          <p:cNvPr id="19" name="Rectangle 18">
+            <a:extLst>
+              <a:ext uri="{FF2B5EF4-FFF2-40B4-BE49-F238E27FC236}">
+                <a16:creationId xmlns:a16="http://schemas.microsoft.com/office/drawing/2014/main" id="{9DECDBF4-02B6-4BB4-B65B-B8107AD6A9E8}"/>
+              </a:ext>
+              <a:ext uri="{C183D7F6-B498-43B3-948B-1728B52AA6E4}">
+                <adec:decorative xmlns:adec="http://schemas.microsoft.com/office/drawing/2017/decorative" val="1"/>
+              </a:ext>
+            </a:extLst>
+          </p:cNvPr>
           <p:cNvSpPr>
-            <a:spLocks noGrp="1"/>
+            <a:spLocks noGrp="1" noRot="1" noChangeAspect="1" noMove="1" noResize="1" noEditPoints="1" noAdjustHandles="1" noChangeArrowheads="1" noChangeShapeType="1" noTextEdit="1"/>
           </p:cNvSpPr>
           <p:nvPr>
-            <p:ph type="title"/>
+            <p:extLst>
+              <p:ext uri="{386F3935-93C4-4BCD-93E2-E3B085C9AB24}">
+                <p16:designElem xmlns:p16="http://schemas.microsoft.com/office/powerpoint/2015/main" val="1"/>
+              </p:ext>
+            </p:extLst>
           </p:nvPr>
         </p:nvSpPr>
         <p:spPr>
-          <a:xfrm>
-            <a:off x="614678" y="548640"/>
-            <a:ext cx="7098627" cy="1325236"/>
+          <a:xfrm flipV="1">
+            <a:off x="841248" y="2776031"/>
+            <a:ext cx="1873457" cy="137160"/>
           </a:xfrm>
+          <a:prstGeom prst="rect">
+            <a:avLst/>
+          </a:prstGeom>
+          <a:solidFill>
+            <a:schemeClr val="accent2"/>
+          </a:solidFill>
+          <a:ln>
+            <a:noFill/>
+          </a:ln>
         </p:spPr>
+        <p:style>
+          <a:lnRef idx="2">
+            <a:schemeClr val="accent1">
+              <a:shade val="50000"/>
+            </a:schemeClr>
+          </a:lnRef>
+          <a:fillRef idx="1">
+            <a:schemeClr val="accent1"/>
+          </a:fillRef>
+          <a:effectRef idx="0">
+            <a:schemeClr val="accent1"/>
+          </a:effectRef>
+          <a:fontRef idx="minor">
+            <a:schemeClr val="lt1"/>
+          </a:fontRef>
+        </p:style>
         <p:txBody>
-          <a:bodyPr anchor="t">
-            <a:normAutofit/>
-          </a:bodyPr>
+          <a:bodyPr rtlCol="0" anchor="ctr"/>
           <a:lstStyle/>
           <a:p>
-            <a:r>
-              <a:rPr lang="en-US" sz="3700">
-                <a:latin typeface="Arial Black" panose="020B0A04020102020204" pitchFamily="34" charset="0"/>
-              </a:rPr>
-              <a:t>Impact of Geography and physical Environment </a:t>
-            </a:r>
+            <a:pPr algn="ctr"/>
+            <a:endParaRPr lang="en-US">
+              <a:solidFill>
+                <a:prstClr val="white"/>
+              </a:solidFill>
+              <a:latin typeface="Calibri" panose="020F0502020204030204"/>
+            </a:endParaRPr>
           </a:p>
         </p:txBody>
       </p:sp>
@@ -11171,36 +11677,36 @@
         </p:nvSpPr>
         <p:spPr>
           <a:xfrm>
-            <a:off x="2432424" y="1899631"/>
-            <a:ext cx="7333128" cy="4011769"/>
+            <a:off x="841248" y="3337269"/>
+            <a:ext cx="10509504" cy="2905686"/>
           </a:xfrm>
         </p:spPr>
         <p:txBody>
-          <a:bodyPr anchor="ctr">
+          <a:bodyPr>
             <a:normAutofit/>
           </a:bodyPr>
           <a:lstStyle/>
           <a:p>
             <a:r>
-              <a:rPr lang="en-US" sz="1800"/>
+              <a:rPr lang="en-US" sz="2200"/>
               <a:t>Great influence of Geographical location and physical living conditions on society, culture and all aspects of life of the people </a:t>
             </a:r>
           </a:p>
           <a:p>
             <a:r>
-              <a:rPr lang="en-US" sz="1800"/>
+              <a:rPr lang="en-US" sz="2200"/>
               <a:t>People living in a cold, dry country and those living in a warm, humid climate have different ways of life</a:t>
             </a:r>
           </a:p>
           <a:p>
             <a:r>
-              <a:rPr lang="en-US" sz="1800"/>
+              <a:rPr lang="en-US" sz="2200"/>
               <a:t>Even the amount of humidity in air, type of food consumed by the people dictate their lifestyle, socio-cultural norms etc</a:t>
             </a:r>
           </a:p>
           <a:p>
             <a:r>
-              <a:rPr lang="en-US" sz="1800"/>
+              <a:rPr lang="en-US" sz="2200"/>
               <a:t>Since history is created by human thoughts and actions, their living conditions need to be carefully explored </a:t>
             </a:r>
           </a:p>

</xml_diff>